<commit_message>
update SQA document ID
</commit_message>
<xml_diff>
--- a/doc/sqa/SR2ML_SQA_Status_Dashboard.pptx
+++ b/doc/sqa/SR2ML_SQA_Status_Dashboard.pptx
@@ -3580,7 +3580,7 @@
             <a:avLst/>
           </a:prstGeom>
           <a:solidFill>
-            <a:srgbClr val="FFC000"/>
+            <a:srgbClr val="00D200"/>
           </a:solidFill>
           <a:ln>
             <a:noFill/>
@@ -3765,7 +3765,7 @@
             <a:avLst/>
           </a:prstGeom>
           <a:solidFill>
-            <a:srgbClr val="FFC000"/>
+            <a:srgbClr val="00D200"/>
           </a:solidFill>
           <a:ln>
             <a:noFill/>
@@ -4043,21 +4043,8 @@
                   <a:schemeClr val="bg1"/>
                 </a:solidFill>
               </a:rPr>
-              <a:t>SSD-</a:t>
-            </a:r>
-            <a:r>
-              <a:rPr lang="en-US" sz="900" b="1" dirty="0" err="1">
-                <a:solidFill>
-                  <a:schemeClr val="bg1"/>
-                </a:solidFill>
-              </a:rPr>
-              <a:t>xxxxx</a:t>
-            </a:r>
-            <a:endParaRPr lang="en-US" sz="900" b="1" dirty="0">
-              <a:solidFill>
-                <a:schemeClr val="bg1"/>
-              </a:solidFill>
-            </a:endParaRPr>
+              <a:t>SSD-000763</a:t>
+            </a:r>
           </a:p>
         </p:txBody>
       </p:sp>
@@ -4070,7 +4057,7 @@
         <p:spPr>
           <a:xfrm>
             <a:off x="783691" y="3318804"/>
-            <a:ext cx="891591" cy="784830"/>
+            <a:ext cx="891591" cy="923330"/>
           </a:xfrm>
           <a:prstGeom prst="rect">
             <a:avLst/>
@@ -4153,6 +4140,17 @@
                 </a:solidFill>
               </a:rPr>
               <a:t>Determination</a:t>
+            </a:r>
+          </a:p>
+          <a:p>
+            <a:pPr algn="ctr"/>
+            <a:r>
+              <a:rPr lang="en-US" sz="900" b="1" dirty="0">
+                <a:solidFill>
+                  <a:schemeClr val="bg1"/>
+                </a:solidFill>
+              </a:rPr>
+              <a:t>REC-000436</a:t>
             </a:r>
             <a:br>
               <a:rPr lang="en-US" sz="900" b="1" dirty="0">

</xml_diff>